<commit_message>
Bug fix and PPT spelling fixes
</commit_message>
<xml_diff>
--- a/_PythonNotebooks/_Course2_Statistics_Essentials/Mod6_Lendingclub_casestudy/Lending Club Case Study_Siddakka_V3.pptx
+++ b/_PythonNotebooks/_Course2_Statistics_Essentials/Mod6_Lendingclub_casestudy/Lending Club Case Study_Siddakka_V3.pptx
@@ -8357,7 +8357,19 @@
               <a:rPr lang="en-IN" sz="1800" b="1" dirty="0">
                 <a:latin typeface="Helvetica Neue"/>
               </a:rPr>
-              <a:t>Whenever LC receives an application they can derive at a risk score as a factor of all the above parameters by assigning a weightage to them.</a:t>
+              <a:t>Whenever LC receives an application they </a:t>
+            </a:r>
+            <a:r>
+              <a:rPr lang="en-IN" sz="1800" b="1">
+                <a:latin typeface="Helvetica Neue"/>
+              </a:rPr>
+              <a:t>can derive </a:t>
+            </a:r>
+            <a:r>
+              <a:rPr lang="en-IN" sz="1800" b="1" dirty="0">
+                <a:latin typeface="Helvetica Neue"/>
+              </a:rPr>
+              <a:t>a risk score as a factor of all the above parameters by assigning a weightage to them.</a:t>
             </a:r>
           </a:p>
           <a:p>

</xml_diff>